<commit_message>
Better slides for a presentation
</commit_message>
<xml_diff>
--- a/gen/test2.pptx
+++ b/gen/test2.pptx
@@ -16,7 +16,7 @@
     <p:sldId id="264" r:id="rId15"/>
     <p:sldId id="265" r:id="rId16"/>
   </p:sldIdLst>
-  <p:sldSz cx="9144000" cy="6858000" type="screen4x3"/>
+  <p:sldSz cx="14630400" cy="8229600" type="screen4x3"/>
   <p:notesSz cx="6858000" cy="9144000"/>
   <p:defaultTextStyle>
     <a:defPPr>
@@ -3105,8 +3105,8 @@
         </p:nvSpPr>
         <p:spPr>
           <a:xfrm>
-            <a:off x="5029200" y="91440"/>
-            <a:ext cx="0" cy="0"/>
+            <a:off x="914400" y="914400"/>
+            <a:ext cx="14630400" cy="8229600"/>
           </a:xfrm>
           <a:prstGeom prst="rect">
             <a:avLst/>
@@ -3114,8 +3114,8 @@
           <a:noFill/>
         </p:spPr>
         <p:txBody>
-          <a:bodyPr wrap="none">
-            <a:spAutoFit/>
+          <a:bodyPr wrap="none" anchor="t">
+            <a:normAutofit/>
           </a:bodyPr>
           <a:lstStyle/>
           <a:p/>
@@ -3136,35 +3136,39 @@
             </a:r>
             <a:br/>
             <a:r>
-              <a:t>магазина скейтбордов в Санкт-Петербурге является распространенной </a:t>
-            </a:r>
-            <a:br/>
-            <a:r>
-              <a:t>проблемой среди скейтбордистов и любителей спорта. Скейтерам </a:t>
-            </a:r>
-            <a:br/>
-            <a:r>
-              <a:t>необходим доступ к качественному снаряжению, оборудованию </a:t>
-            </a:r>
-            <a:br/>
-            <a:r>
-              <a:t>и одежде для скейтбординга, чтобы заниматься своим </a:t>
-            </a:r>
-            <a:br/>
-            <a:r>
-              <a:t>увлечением и совершенствовать свои навыки. Эта проблема </a:t>
-            </a:r>
-            <a:br/>
-            <a:r>
-              <a:t>весьма актуальна, поскольку скейтборд-сообщество в </a:t>
-            </a:r>
-            <a:br/>
-            <a:r>
-              <a:t>Санкт-Петербурге быстро растет, что создает спрос на </a:t>
-            </a:r>
-            <a:br/>
-            <a:r>
-              <a:t>специализированный скейтборд-магазин. </a:t>
+              <a:t>магазина скейтбордов в Санкт-Петербурге является </a:t>
+            </a:r>
+            <a:br/>
+            <a:r>
+              <a:t>распространенной проблемой среди скейтбордистов </a:t>
+            </a:r>
+            <a:br/>
+            <a:r>
+              <a:t>и любителей спорта. Скейтерам необходим доступ </a:t>
+            </a:r>
+            <a:br/>
+            <a:r>
+              <a:t>к качественному снаряжению, оборудованию и </a:t>
+            </a:r>
+            <a:br/>
+            <a:r>
+              <a:t>одежде для скейтбординга, чтобы заниматься </a:t>
+            </a:r>
+            <a:br/>
+            <a:r>
+              <a:t>своим увлечением и совершенствовать свои навыки. Эта </a:t>
+            </a:r>
+            <a:br/>
+            <a:r>
+              <a:t>проблема весьма актуальна, поскольку скейтборд-сообщество </a:t>
+            </a:r>
+            <a:br/>
+            <a:r>
+              <a:t>в Санкт-Петербурге быстро растет, что создает </a:t>
+            </a:r>
+            <a:br/>
+            <a:r>
+              <a:t>спрос на специализированный скейтборд-магазин. </a:t>
             </a:r>
           </a:p>
         </p:txBody>
@@ -3195,8 +3199,8 @@
         </p:nvSpPr>
         <p:spPr>
           <a:xfrm>
-            <a:off x="5029200" y="91440"/>
-            <a:ext cx="0" cy="0"/>
+            <a:off x="914400" y="914400"/>
+            <a:ext cx="14630400" cy="8229600"/>
           </a:xfrm>
           <a:prstGeom prst="rect">
             <a:avLst/>
@@ -3204,8 +3208,8 @@
           <a:noFill/>
         </p:spPr>
         <p:txBody>
-          <a:bodyPr wrap="none">
-            <a:spAutoFit/>
+          <a:bodyPr wrap="none" anchor="t">
+            <a:normAutofit/>
           </a:bodyPr>
           <a:lstStyle/>
           <a:p/>
@@ -3222,19 +3226,23 @@
               <a:defRPr sz="2000"/>
             </a:pPr>
             <a:r>
-              <a:t>Мы выражаем нашу благодарность за рассмотрение преобразующего </a:t>
-            </a:r>
-            <a:br/>
-            <a:r>
-              <a:t>проекта Сквота. Присоединяйтесь к нам, чтобы расширить </a:t>
-            </a:r>
-            <a:br/>
-            <a:r>
-              <a:t>возможности скейтбордистов и формировать культуру скейтбординга </a:t>
-            </a:r>
-            <a:br/>
-            <a:r>
-              <a:t>в Санкт-Петербурге и за его пределами. </a:t>
+              <a:t>Мы выражаем нашу благодарность за рассмотрение </a:t>
+            </a:r>
+            <a:br/>
+            <a:r>
+              <a:t>преобразующего проекта Сквота. Присоединяйтесь </a:t>
+            </a:r>
+            <a:br/>
+            <a:r>
+              <a:t>к нам, чтобы расширить возможности скейтбордистов </a:t>
+            </a:r>
+            <a:br/>
+            <a:r>
+              <a:t>и формировать культуру скейтбординга в Санкт-Петербурге </a:t>
+            </a:r>
+            <a:br/>
+            <a:r>
+              <a:t>и за его пределами. </a:t>
             </a:r>
           </a:p>
         </p:txBody>
@@ -3265,8 +3273,8 @@
         </p:nvSpPr>
         <p:spPr>
           <a:xfrm>
-            <a:off x="5029200" y="91440"/>
-            <a:ext cx="0" cy="0"/>
+            <a:off x="914400" y="914400"/>
+            <a:ext cx="14630400" cy="8229600"/>
           </a:xfrm>
           <a:prstGeom prst="rect">
             <a:avLst/>
@@ -3274,8 +3282,8 @@
           <a:noFill/>
         </p:spPr>
         <p:txBody>
-          <a:bodyPr wrap="none">
-            <a:spAutoFit/>
+          <a:bodyPr wrap="none" anchor="t">
+            <a:normAutofit/>
           </a:bodyPr>
           <a:lstStyle/>
           <a:p/>
@@ -3292,39 +3300,43 @@
               <a:defRPr sz="2000"/>
             </a:pPr>
             <a:r>
-              <a:t>Рынок скейтбординга в Санкт-Петербурге имеет значительную </a:t>
-            </a:r>
-            <a:br/>
-            <a:r>
-              <a:t>ценность благодаря яркой культуре скейтбординга в городе </a:t>
-            </a:r>
-            <a:br/>
-            <a:r>
-              <a:t>и растущей популярности скейтбординга как вида спорта. Мы </a:t>
-            </a:r>
-            <a:br/>
-            <a:r>
-              <a:t>нацелены на скейтбордистов и любителей спорта в возрасте </a:t>
-            </a:r>
-            <a:br/>
-            <a:r>
-              <a:t>от 18 до 35 лет в Санкт-Петербурге, Россия. Skvot выделяется </a:t>
-            </a:r>
-            <a:br/>
-            <a:r>
-              <a:t>как оптимальное решение, предлагая широкий ассортимент </a:t>
-            </a:r>
-            <a:br/>
-            <a:r>
-              <a:t>высококачественной продукции для скейтбординга и опытную </a:t>
-            </a:r>
-            <a:br/>
-            <a:r>
-              <a:t>команду для удовлетворения конкретных потребностей </a:t>
-            </a:r>
-            <a:br/>
-            <a:r>
-              <a:t>скейтбордистов. </a:t>
+              <a:t>Рынок скейтбординга в Санкт-Петербурге имеет </a:t>
+            </a:r>
+            <a:br/>
+            <a:r>
+              <a:t>значительную ценность благодаря яркой культуре </a:t>
+            </a:r>
+            <a:br/>
+            <a:r>
+              <a:t>скейтбординга в городе и растущей популярности </a:t>
+            </a:r>
+            <a:br/>
+            <a:r>
+              <a:t>скейтбординга как вида спорта. Мы нацелены </a:t>
+            </a:r>
+            <a:br/>
+            <a:r>
+              <a:t>на скейтбордистов и любителей спорта в возрасте </a:t>
+            </a:r>
+            <a:br/>
+            <a:r>
+              <a:t>от 18 до 35 лет в Санкт-Петербурге, Россия. Skvot </a:t>
+            </a:r>
+            <a:br/>
+            <a:r>
+              <a:t>выделяется как оптимальное решение, предлагая </a:t>
+            </a:r>
+            <a:br/>
+            <a:r>
+              <a:t>широкий ассортимент высококачественной продукции </a:t>
+            </a:r>
+            <a:br/>
+            <a:r>
+              <a:t>для скейтбординга и опытную команду для удовлетворения </a:t>
+            </a:r>
+            <a:br/>
+            <a:r>
+              <a:t>конкретных потребностей скейтбордистов. </a:t>
             </a:r>
           </a:p>
         </p:txBody>
@@ -3355,8 +3367,8 @@
         </p:nvSpPr>
         <p:spPr>
           <a:xfrm>
-            <a:off x="5029200" y="91440"/>
-            <a:ext cx="0" cy="0"/>
+            <a:off x="914400" y="914400"/>
+            <a:ext cx="14630400" cy="8229600"/>
           </a:xfrm>
           <a:prstGeom prst="rect">
             <a:avLst/>
@@ -3364,8 +3376,8 @@
           <a:noFill/>
         </p:spPr>
         <p:txBody>
-          <a:bodyPr wrap="none">
-            <a:spAutoFit/>
+          <a:bodyPr wrap="none" anchor="t">
+            <a:normAutofit/>
           </a:bodyPr>
           <a:lstStyle/>
           <a:p/>
@@ -3386,27 +3398,31 @@
             </a:r>
             <a:br/>
             <a:r>
-              <a:t>оборудования и одежды для скейтбординга. .Мы реализуем </a:t>
-            </a:r>
-            <a:br/>
-            <a:r>
-              <a:t>конкурентоспособную ценовую стратегию, основанную на </a:t>
-            </a:r>
-            <a:br/>
-            <a:r>
-              <a:t>нашем стремлении предоставлять высококачественную продукцию </a:t>
-            </a:r>
-            <a:br/>
-            <a:r>
-              <a:t>по доступным ценам. Исключительное обслуживание клиентов </a:t>
-            </a:r>
-            <a:br/>
-            <a:r>
-              <a:t>Skvot и преданность сообществу скейтбордистов гарантируют </a:t>
-            </a:r>
-            <a:br/>
-            <a:r>
-              <a:t>лояльность клиентов и возможность повторных сделок. </a:t>
+              <a:t>оборудования и одежды для скейтбординга. .Мы </a:t>
+            </a:r>
+            <a:br/>
+            <a:r>
+              <a:t>реализуем конкурентоспособную ценовую стратегию, </a:t>
+            </a:r>
+            <a:br/>
+            <a:r>
+              <a:t>основанную на нашем стремлении предоставлять </a:t>
+            </a:r>
+            <a:br/>
+            <a:r>
+              <a:t>высококачественную продукцию по доступным ценам. Исключительное </a:t>
+            </a:r>
+            <a:br/>
+            <a:r>
+              <a:t>обслуживание клиентов Skvot и преданность сообществу </a:t>
+            </a:r>
+            <a:br/>
+            <a:r>
+              <a:t>скейтбордистов гарантируют лояльность клиентов </a:t>
+            </a:r>
+            <a:br/>
+            <a:r>
+              <a:t>и возможность повторных сделок. </a:t>
             </a:r>
           </a:p>
         </p:txBody>
@@ -3437,8 +3453,8 @@
         </p:nvSpPr>
         <p:spPr>
           <a:xfrm>
-            <a:off x="5029200" y="91440"/>
-            <a:ext cx="0" cy="0"/>
+            <a:off x="914400" y="914400"/>
+            <a:ext cx="14630400" cy="8229600"/>
           </a:xfrm>
           <a:prstGeom prst="rect">
             <a:avLst/>
@@ -3446,8 +3462,8 @@
           <a:noFill/>
         </p:spPr>
         <p:txBody>
-          <a:bodyPr wrap="none">
-            <a:spAutoFit/>
+          <a:bodyPr wrap="none" anchor="t">
+            <a:normAutofit/>
           </a:bodyPr>
           <a:lstStyle/>
           <a:p/>
@@ -3468,23 +3484,27 @@
             </a:r>
             <a:br/>
             <a:r>
-              <a:t>ежемесячной посещаемости в 30 000 посетителей наш успех </a:t>
-            </a:r>
-            <a:br/>
-            <a:r>
-              <a:t>очевиден. Предоставляя скейтбордистам необходимое снаряжение </a:t>
-            </a:r>
-            <a:br/>
-            <a:r>
-              <a:t>и аксессуары, мы даем им возможность заниматься своим </a:t>
-            </a:r>
-            <a:br/>
-            <a:r>
-              <a:t>хобби и совершенствовать свои навыки, способствуя развитию </a:t>
-            </a:r>
-            <a:br/>
-            <a:r>
-              <a:t>местной скейтбордической сцены. </a:t>
+              <a:t>ежемесячной посещаемости в 30 000 посетителей </a:t>
+            </a:r>
+            <a:br/>
+            <a:r>
+              <a:t>наш успех очевиден. Предоставляя скейтбордистам </a:t>
+            </a:r>
+            <a:br/>
+            <a:r>
+              <a:t>необходимое снаряжение и аксессуары, мы даем </a:t>
+            </a:r>
+            <a:br/>
+            <a:r>
+              <a:t>им возможность заниматься своим хобби и совершенствовать </a:t>
+            </a:r>
+            <a:br/>
+            <a:r>
+              <a:t>свои навыки, способствуя развитию местной скейтбордической </a:t>
+            </a:r>
+            <a:br/>
+            <a:r>
+              <a:t>сцены. </a:t>
             </a:r>
           </a:p>
         </p:txBody>
@@ -3515,8 +3535,8 @@
         </p:nvSpPr>
         <p:spPr>
           <a:xfrm>
-            <a:off x="5029200" y="91440"/>
-            <a:ext cx="0" cy="0"/>
+            <a:off x="914400" y="914400"/>
+            <a:ext cx="14630400" cy="8229600"/>
           </a:xfrm>
           <a:prstGeom prst="rect">
             <a:avLst/>
@@ -3524,8 +3544,8 @@
           <a:noFill/>
         </p:spPr>
         <p:txBody>
-          <a:bodyPr wrap="none">
-            <a:spAutoFit/>
+          <a:bodyPr wrap="none" anchor="t">
+            <a:normAutofit/>
           </a:bodyPr>
           <a:lstStyle/>
           <a:p/>
@@ -3542,31 +3562,31 @@
               <a:defRPr sz="2000"/>
             </a:pPr>
             <a:r>
-              <a:t>Наше уникальное предложение заключается в широком выборе </a:t>
-            </a:r>
-            <a:br/>
-            <a:r>
-              <a:t>высококачественной продукции для скейтбордов и нашей </a:t>
-            </a:r>
-            <a:br/>
-            <a:r>
-              <a:t>знающей команде, которая может предоставить индивидуальные </a:t>
-            </a:r>
-            <a:br/>
-            <a:r>
-              <a:t>рекомендации. Сквот является излюбленным местом для </a:t>
-            </a:r>
-            <a:br/>
-            <a:r>
-              <a:t>скейтбордистов в Санкт-Петербурге благодаря нашей приверженности </a:t>
-            </a:r>
-            <a:br/>
-            <a:r>
-              <a:t>качеству, обслуживанию клиентов и пониманию культуры </a:t>
-            </a:r>
-            <a:br/>
-            <a:r>
-              <a:t>скейтбординга. </a:t>
+              <a:t>Наше уникальное предложение заключается в широком </a:t>
+            </a:r>
+            <a:br/>
+            <a:r>
+              <a:t>выборе высококачественной продукции для скейтбордов </a:t>
+            </a:r>
+            <a:br/>
+            <a:r>
+              <a:t>и нашей знающей команде, которая может предоставить </a:t>
+            </a:r>
+            <a:br/>
+            <a:r>
+              <a:t>индивидуальные рекомендации. Сквот является </a:t>
+            </a:r>
+            <a:br/>
+            <a:r>
+              <a:t>излюбленным местом для скейтбордистов в Санкт-Петербурге </a:t>
+            </a:r>
+            <a:br/>
+            <a:r>
+              <a:t>благодаря нашей приверженности качеству, обслуживанию </a:t>
+            </a:r>
+            <a:br/>
+            <a:r>
+              <a:t>клиентов и пониманию культуры скейтбординга. </a:t>
             </a:r>
           </a:p>
         </p:txBody>
@@ -3597,8 +3617,8 @@
         </p:nvSpPr>
         <p:spPr>
           <a:xfrm>
-            <a:off x="5029200" y="91440"/>
-            <a:ext cx="0" cy="0"/>
+            <a:off x="914400" y="914400"/>
+            <a:ext cx="14630400" cy="8229600"/>
           </a:xfrm>
           <a:prstGeom prst="rect">
             <a:avLst/>
@@ -3606,8 +3626,8 @@
           <a:noFill/>
         </p:spPr>
         <p:txBody>
-          <a:bodyPr wrap="none">
-            <a:spAutoFit/>
+          <a:bodyPr wrap="none" anchor="t">
+            <a:normAutofit/>
           </a:bodyPr>
           <a:lstStyle/>
           <a:p/>
@@ -3668,8 +3688,8 @@
         </p:nvSpPr>
         <p:spPr>
           <a:xfrm>
-            <a:off x="5029200" y="91440"/>
-            <a:ext cx="0" cy="0"/>
+            <a:off x="914400" y="914400"/>
+            <a:ext cx="14630400" cy="8229600"/>
           </a:xfrm>
           <a:prstGeom prst="rect">
             <a:avLst/>
@@ -3677,8 +3697,8 @@
           <a:noFill/>
         </p:spPr>
         <p:txBody>
-          <a:bodyPr wrap="none">
-            <a:spAutoFit/>
+          <a:bodyPr wrap="none" anchor="t">
+            <a:normAutofit/>
           </a:bodyPr>
           <a:lstStyle/>
           <a:p/>
@@ -3695,27 +3715,27 @@
               <a:defRPr sz="2000"/>
             </a:pPr>
             <a:r>
-              <a:t>В фокусе нашего внимания скейтбордисты и любители спорта </a:t>
-            </a:r>
-            <a:br/>
-            <a:r>
-              <a:t>в возрасте от 18 до 35 лет в Санкт-Петербурге, Россия. За </a:t>
-            </a:r>
-            <a:br/>
-            <a:r>
-              <a:t>пределами Санкт-Петербурга мы планируем расширяться </a:t>
-            </a:r>
-            <a:br/>
-            <a:r>
-              <a:t>и в других городах России, чтобы удовлетворить растущий </a:t>
-            </a:r>
-            <a:br/>
-            <a:r>
-              <a:t>спрос на высококачественную продукцию и услуги для </a:t>
-            </a:r>
-            <a:br/>
-            <a:r>
-              <a:t>скейтбордов. </a:t>
+              <a:t>В фокусе нашего внимания скейтбордисты и любители </a:t>
+            </a:r>
+            <a:br/>
+            <a:r>
+              <a:t>спорта в возрасте от 18 до 35 лет в Санкт-Петербурге, </a:t>
+            </a:r>
+            <a:br/>
+            <a:r>
+              <a:t>Россия. За пределами Санкт-Петербурга мы планируем </a:t>
+            </a:r>
+            <a:br/>
+            <a:r>
+              <a:t>расширяться и в других городах России, чтобы </a:t>
+            </a:r>
+            <a:br/>
+            <a:r>
+              <a:t>удовлетворить растущий спрос на высококачественную </a:t>
+            </a:r>
+            <a:br/>
+            <a:r>
+              <a:t>продукцию и услуги для скейтбордов. </a:t>
             </a:r>
           </a:p>
         </p:txBody>
@@ -3746,8 +3766,8 @@
         </p:nvSpPr>
         <p:spPr>
           <a:xfrm>
-            <a:off x="5029200" y="91440"/>
-            <a:ext cx="0" cy="0"/>
+            <a:off x="914400" y="914400"/>
+            <a:ext cx="14630400" cy="8229600"/>
           </a:xfrm>
           <a:prstGeom prst="rect">
             <a:avLst/>
@@ -3755,8 +3775,8 @@
           <a:noFill/>
         </p:spPr>
         <p:txBody>
-          <a:bodyPr wrap="none">
-            <a:spAutoFit/>
+          <a:bodyPr wrap="none" anchor="t">
+            <a:normAutofit/>
           </a:bodyPr>
           <a:lstStyle/>
           <a:p/>
@@ -3777,27 +3797,27 @@
             </a:r>
             <a:br/>
             <a:r>
-              <a:t>средства будут направлены на приобретение нового оборудования, </a:t>
-            </a:r>
-            <a:br/>
-            <a:r>
-              <a:t>расширение ассортимента нашей продукции и реализацию </a:t>
-            </a:r>
-            <a:br/>
-            <a:r>
-              <a:t>маркетинговых стратегий, позволяющих удвоить наш доход </a:t>
-            </a:r>
-            <a:br/>
-            <a:r>
-              <a:t>в течение года. Мы стремимся предоставить инвесторам </a:t>
-            </a:r>
-            <a:br/>
-            <a:r>
-              <a:t>двукратную прибыль от своих инвестиций в течение 12 </a:t>
-            </a:r>
-            <a:br/>
-            <a:r>
-              <a:t>месяцев. </a:t>
+              <a:t>средства будут направлены на приобретение нового </a:t>
+            </a:r>
+            <a:br/>
+            <a:r>
+              <a:t>оборудования, расширение ассортимента нашей </a:t>
+            </a:r>
+            <a:br/>
+            <a:r>
+              <a:t>продукции и реализацию маркетинговых стратегий, </a:t>
+            </a:r>
+            <a:br/>
+            <a:r>
+              <a:t>позволяющих удвоить наш доход в течение года. Мы </a:t>
+            </a:r>
+            <a:br/>
+            <a:r>
+              <a:t>стремимся предоставить инвесторам двукратную </a:t>
+            </a:r>
+            <a:br/>
+            <a:r>
+              <a:t>прибыль от своих инвестиций в течение 12 месяцев. </a:t>
             </a:r>
           </a:p>
         </p:txBody>
@@ -3828,8 +3848,8 @@
         </p:nvSpPr>
         <p:spPr>
           <a:xfrm>
-            <a:off x="5029200" y="91440"/>
-            <a:ext cx="0" cy="0"/>
+            <a:off x="914400" y="914400"/>
+            <a:ext cx="14630400" cy="8229600"/>
           </a:xfrm>
           <a:prstGeom prst="rect">
             <a:avLst/>
@@ -3837,8 +3857,8 @@
           <a:noFill/>
         </p:spPr>
         <p:txBody>
-          <a:bodyPr wrap="none">
-            <a:spAutoFit/>
+          <a:bodyPr wrap="none" anchor="t">
+            <a:normAutofit/>
           </a:bodyPr>
           <a:lstStyle/>
           <a:p/>
@@ -3855,11 +3875,11 @@
               <a:defRPr sz="2000"/>
             </a:pPr>
             <a:r>
-              <a:t>По вопросам и возможностям партнерства свяжитесь с </a:t>
-            </a:r>
-            <a:br/>
-            <a:r>
-              <a:t>нами напрямую по телефону 123456789. </a:t>
+              <a:t>По вопросам и возможностям партнерства свяжитесь </a:t>
+            </a:r>
+            <a:br/>
+            <a:r>
+              <a:t>с нами напрямую по телефону 123456789. </a:t>
             </a:r>
           </a:p>
         </p:txBody>

</xml_diff>

<commit_message>
Added a title slide generation
</commit_message>
<xml_diff>
--- a/gen/test2.pptx
+++ b/gen/test2.pptx
@@ -15,6 +15,7 @@
     <p:sldId id="263" r:id="rId14"/>
     <p:sldId id="264" r:id="rId15"/>
     <p:sldId id="265" r:id="rId16"/>
+    <p:sldId id="266" r:id="rId17"/>
   </p:sldIdLst>
   <p:sldSz cx="14630400" cy="8229600" type="screen4x3"/>
   <p:notesSz cx="6858000" cy="9144000"/>
@@ -3099,76 +3100,42 @@
       <p:grpSpPr/>
       <p:sp>
         <p:nvSpPr>
-          <p:cNvPr id="2" name="TextBox 1"/>
-          <p:cNvSpPr txBox="1"/>
-          <p:nvPr/>
-        </p:nvSpPr>
-        <p:spPr>
-          <a:xfrm>
-            <a:off x="914400" y="914400"/>
-            <a:ext cx="14630400" cy="8229600"/>
-          </a:xfrm>
-          <a:prstGeom prst="rect">
-            <a:avLst/>
-          </a:prstGeom>
-          <a:noFill/>
-        </p:spPr>
-        <p:txBody>
-          <a:bodyPr wrap="none" anchor="t">
-            <a:normAutofit/>
-          </a:bodyPr>
-          <a:lstStyle/>
-          <a:p/>
-          <a:p>
-            <a:pPr algn="l">
-              <a:defRPr b="1" sz="6000"/>
-            </a:pPr>
-            <a:r>
-              <a:t>Постановка задачи.</a:t>
-            </a:r>
-          </a:p>
-          <a:p>
-            <a:pPr algn="l">
-              <a:defRPr sz="2000"/>
-            </a:pPr>
-            <a:r>
-              <a:t>Отсутствие хорошо укомплектованного и клиентоориентированного </a:t>
-            </a:r>
-            <a:br/>
-            <a:r>
-              <a:t>магазина скейтбордов в Санкт-Петербурге является </a:t>
-            </a:r>
-            <a:br/>
-            <a:r>
-              <a:t>распространенной проблемой среди скейтбордистов </a:t>
-            </a:r>
-            <a:br/>
-            <a:r>
-              <a:t>и любителей спорта. Скейтерам необходим доступ </a:t>
-            </a:r>
-            <a:br/>
-            <a:r>
-              <a:t>к качественному снаряжению, оборудованию и </a:t>
-            </a:r>
-            <a:br/>
-            <a:r>
-              <a:t>одежде для скейтбординга, чтобы заниматься </a:t>
-            </a:r>
-            <a:br/>
-            <a:r>
-              <a:t>своим увлечением и совершенствовать свои навыки. Эта </a:t>
-            </a:r>
-            <a:br/>
-            <a:r>
-              <a:t>проблема весьма актуальна, поскольку скейтборд-сообщество </a:t>
-            </a:r>
-            <a:br/>
-            <a:r>
-              <a:t>в Санкт-Петербурге быстро растет, что создает </a:t>
-            </a:r>
-            <a:br/>
-            <a:r>
-              <a:t>спрос на специализированный скейтборд-магазин. </a:t>
+          <p:cNvPr id="2" name="Title 1"/>
+          <p:cNvSpPr>
+            <a:spLocks noGrp="1"/>
+          </p:cNvSpPr>
+          <p:nvPr>
+            <p:ph type="title"/>
+          </p:nvPr>
+        </p:nvSpPr>
+        <p:spPr/>
+        <p:txBody>
+          <a:bodyPr/>
+          <a:lstStyle/>
+          <a:p>
+            <a:r>
+              <a:t>SimpleCoffe</a:t>
+            </a:r>
+          </a:p>
+        </p:txBody>
+      </p:sp>
+      <p:sp>
+        <p:nvSpPr>
+          <p:cNvPr id="3" name="Text Placeholder 2"/>
+          <p:cNvSpPr>
+            <a:spLocks noGrp="1"/>
+          </p:cNvSpPr>
+          <p:nvPr>
+            <p:ph type="body" idx="1"/>
+          </p:nvPr>
+        </p:nvSpPr>
+        <p:spPr/>
+        <p:txBody>
+          <a:bodyPr/>
+          <a:lstStyle/>
+          <a:p>
+            <a:r>
+              <a:t>pitch deck 2023</a:t>
             </a:r>
           </a:p>
         </p:txBody>
@@ -3215,10 +3182,10 @@
           <a:p/>
           <a:p>
             <a:pPr algn="l">
-              <a:defRPr b="1" sz="6000"/>
+              <a:defRPr b="1" sz="5000"/>
             </a:pPr>
             <a:r>
-              <a:t>Спасибо.</a:t>
+              <a:t>Контактная информация.</a:t>
             </a:r>
           </a:p>
           <a:p>
@@ -3226,19 +3193,77 @@
               <a:defRPr sz="2000"/>
             </a:pPr>
             <a:r>
+              <a:t>По вопросам сотрудничества и возможностям сотрудничества </a:t>
+            </a:r>
+            <a:br/>
+            <a:r>
+              <a:t>обращайтесь напрямую по телефону 123456789. </a:t>
+            </a:r>
+          </a:p>
+        </p:txBody>
+      </p:sp>
+    </p:spTree>
+  </p:cSld>
+  <p:clrMapOvr>
+    <a:masterClrMapping/>
+  </p:clrMapOvr>
+</p:sld>
+</file>
+
+<file path=ppt/slides/slide11.xml><?xml version="1.0" encoding="utf-8"?>
+<p:sld xmlns:a="http://schemas.openxmlformats.org/drawingml/2006/main" xmlns:p="http://schemas.openxmlformats.org/presentationml/2006/main" xmlns:r="http://schemas.openxmlformats.org/officeDocument/2006/relationships">
+  <p:cSld>
+    <p:spTree>
+      <p:nvGrpSpPr>
+        <p:cNvPr id="1" name=""/>
+        <p:cNvGrpSpPr/>
+        <p:nvPr/>
+      </p:nvGrpSpPr>
+      <p:grpSpPr/>
+      <p:sp>
+        <p:nvSpPr>
+          <p:cNvPr id="2" name="TextBox 1"/>
+          <p:cNvSpPr txBox="1"/>
+          <p:nvPr/>
+        </p:nvSpPr>
+        <p:spPr>
+          <a:xfrm>
+            <a:off x="914400" y="914400"/>
+            <a:ext cx="14630400" cy="8229600"/>
+          </a:xfrm>
+          <a:prstGeom prst="rect">
+            <a:avLst/>
+          </a:prstGeom>
+          <a:noFill/>
+        </p:spPr>
+        <p:txBody>
+          <a:bodyPr wrap="none" anchor="t">
+            <a:normAutofit/>
+          </a:bodyPr>
+          <a:lstStyle/>
+          <a:p/>
+          <a:p>
+            <a:pPr algn="l">
+              <a:defRPr b="1" sz="6000"/>
+            </a:pPr>
+            <a:r>
+              <a:t>Спасибо.</a:t>
+            </a:r>
+          </a:p>
+          <a:p>
+            <a:pPr algn="l">
+              <a:defRPr sz="2000"/>
+            </a:pPr>
+            <a:r>
               <a:t>Мы выражаем нашу благодарность за рассмотрение </a:t>
             </a:r>
             <a:br/>
             <a:r>
-              <a:t>преобразующего проекта Сквота. Присоединяйтесь </a:t>
-            </a:r>
-            <a:br/>
-            <a:r>
-              <a:t>к нам, чтобы расширить возможности скейтбордистов </a:t>
-            </a:r>
-            <a:br/>
-            <a:r>
-              <a:t>и формировать культуру скейтбординга в Санкт-Петербурге </a:t>
+              <a:t>преобразующего проекта SimpleCoffe. Присоединяйтесь </a:t>
+            </a:r>
+            <a:br/>
+            <a:r>
+              <a:t>к нам, чтобы улучшить качество кофе в Санкт-Петербурге </a:t>
             </a:r>
             <a:br/>
             <a:r>
@@ -3292,7 +3317,7 @@
               <a:defRPr b="1" sz="6000"/>
             </a:pPr>
             <a:r>
-              <a:t>Обзор рынка.</a:t>
+              <a:t>Постановка задачи.</a:t>
             </a:r>
           </a:p>
           <a:p>
@@ -3300,43 +3325,31 @@
               <a:defRPr sz="2000"/>
             </a:pPr>
             <a:r>
-              <a:t>Рынок скейтбординга в Санкт-Петербурге имеет </a:t>
-            </a:r>
-            <a:br/>
-            <a:r>
-              <a:t>значительную ценность благодаря яркой культуре </a:t>
-            </a:r>
-            <a:br/>
-            <a:r>
-              <a:t>скейтбординга в городе и растущей популярности </a:t>
-            </a:r>
-            <a:br/>
-            <a:r>
-              <a:t>скейтбординга как вида спорта. Мы нацелены </a:t>
-            </a:r>
-            <a:br/>
-            <a:r>
-              <a:t>на скейтбордистов и любителей спорта в возрасте </a:t>
-            </a:r>
-            <a:br/>
-            <a:r>
-              <a:t>от 18 до 35 лет в Санкт-Петербурге, Россия. Skvot </a:t>
-            </a:r>
-            <a:br/>
-            <a:r>
-              <a:t>выделяется как оптимальное решение, предлагая </a:t>
-            </a:r>
-            <a:br/>
-            <a:r>
-              <a:t>широкий ассортимент высококачественной продукции </a:t>
-            </a:r>
-            <a:br/>
-            <a:r>
-              <a:t>для скейтбординга и опытную команду для удовлетворения </a:t>
-            </a:r>
-            <a:br/>
-            <a:r>
-              <a:t>конкретных потребностей скейтбордистов. </a:t>
+              <a:t>Отсутствие стабильно высокого качества кофе </a:t>
+            </a:r>
+            <a:br/>
+            <a:r>
+              <a:t>в Санкт-Петербурге является распространенной </a:t>
+            </a:r>
+            <a:br/>
+            <a:r>
+              <a:t>проблемой. Любители кофе жаждут места, которое </a:t>
+            </a:r>
+            <a:br/>
+            <a:r>
+              <a:t>предлагает исключительный вкус и теплую атмосферу, </a:t>
+            </a:r>
+            <a:br/>
+            <a:r>
+              <a:t>способствующую развитию чувства общности. Эта </a:t>
+            </a:r>
+            <a:br/>
+            <a:r>
+              <a:t>проблема весьма актуальна, поскольку спрос </a:t>
+            </a:r>
+            <a:br/>
+            <a:r>
+              <a:t>на кофе премиум-класса быстро растет. </a:t>
             </a:r>
           </a:p>
         </p:txBody>
@@ -3386,7 +3399,7 @@
               <a:defRPr b="1" sz="6000"/>
             </a:pPr>
             <a:r>
-              <a:t>Бизнес модель.</a:t>
+              <a:t>Обзор рынка.</a:t>
             </a:r>
           </a:p>
           <a:p>
@@ -3394,35 +3407,31 @@
               <a:defRPr sz="2000"/>
             </a:pPr>
             <a:r>
-              <a:t>Наш основной источник дохода — продажа снаряжения, </a:t>
-            </a:r>
-            <a:br/>
-            <a:r>
-              <a:t>оборудования и одежды для скейтбординга. .Мы </a:t>
-            </a:r>
-            <a:br/>
-            <a:r>
-              <a:t>реализуем конкурентоспособную ценовую стратегию, </a:t>
-            </a:r>
-            <a:br/>
-            <a:r>
-              <a:t>основанную на нашем стремлении предоставлять </a:t>
-            </a:r>
-            <a:br/>
-            <a:r>
-              <a:t>высококачественную продукцию по доступным ценам. Исключительное </a:t>
-            </a:r>
-            <a:br/>
-            <a:r>
-              <a:t>обслуживание клиентов Skvot и преданность сообществу </a:t>
-            </a:r>
-            <a:br/>
-            <a:r>
-              <a:t>скейтбордистов гарантируют лояльность клиентов </a:t>
-            </a:r>
-            <a:br/>
-            <a:r>
-              <a:t>и возможность повторных сделок. </a:t>
+              <a:t>Рынок кофе в Санкт-Петербурге имеет значительную </a:t>
+            </a:r>
+            <a:br/>
+            <a:r>
+              <a:t>ценность благодаря яркой кофейной культуре </a:t>
+            </a:r>
+            <a:br/>
+            <a:r>
+              <a:t>города. Мы ориентированы на всех полов, возрастов </a:t>
+            </a:r>
+            <a:br/>
+            <a:r>
+              <a:t>и любителей кофе в Санкт-Петербурге. SimpleCoffe </a:t>
+            </a:r>
+            <a:br/>
+            <a:r>
+              <a:t>является оптимальным решением, позволяющим </a:t>
+            </a:r>
+            <a:br/>
+            <a:r>
+              <a:t>приготовить исключительный кофе в уютной обстановке, </a:t>
+            </a:r>
+            <a:br/>
+            <a:r>
+              <a:t>отвечающей этому требованию. </a:t>
             </a:r>
           </a:p>
         </p:txBody>
@@ -3472,7 +3481,7 @@
               <a:defRPr b="1" sz="6000"/>
             </a:pPr>
             <a:r>
-              <a:t>Тяга и удар.</a:t>
+              <a:t>Бизнес модель.</a:t>
             </a:r>
           </a:p>
           <a:p>
@@ -3480,31 +3489,31 @@
               <a:defRPr sz="2000"/>
             </a:pPr>
             <a:r>
-              <a:t>При ежемесячной прибыли в 25 000 рублей и стабильной </a:t>
-            </a:r>
-            <a:br/>
-            <a:r>
-              <a:t>ежемесячной посещаемости в 30 000 посетителей </a:t>
-            </a:r>
-            <a:br/>
-            <a:r>
-              <a:t>наш успех очевиден. Предоставляя скейтбордистам </a:t>
-            </a:r>
-            <a:br/>
-            <a:r>
-              <a:t>необходимое снаряжение и аксессуары, мы даем </a:t>
-            </a:r>
-            <a:br/>
-            <a:r>
-              <a:t>им возможность заниматься своим хобби и совершенствовать </a:t>
-            </a:r>
-            <a:br/>
-            <a:r>
-              <a:t>свои навыки, способствуя развитию местной скейтбордической </a:t>
-            </a:r>
-            <a:br/>
-            <a:r>
-              <a:t>сцены. </a:t>
+              <a:t>Нашим основным источником дохода являются продажи </a:t>
+            </a:r>
+            <a:br/>
+            <a:r>
+              <a:t>кофе, а также прибыль от закусок и других товаров. Мы </a:t>
+            </a:r>
+            <a:br/>
+            <a:r>
+              <a:t>внедряем конкурентоспособные цены, основываясь </a:t>
+            </a:r>
+            <a:br/>
+            <a:r>
+              <a:t>на нашем стремлении обеспечить премиальное </a:t>
+            </a:r>
+            <a:br/>
+            <a:r>
+              <a:t>качество. Приятная атмосфера SimpleCoffe и </a:t>
+            </a:r>
+            <a:br/>
+            <a:r>
+              <a:t>превосходные сорта пива гарантируют лояльность </a:t>
+            </a:r>
+            <a:br/>
+            <a:r>
+              <a:t>клиентов и возможность повторных сделок. </a:t>
             </a:r>
           </a:p>
         </p:txBody>
@@ -3551,10 +3560,10 @@
           <a:p/>
           <a:p>
             <a:pPr algn="l">
-              <a:defRPr b="1" sz="5000"/>
+              <a:defRPr b="1" sz="6000"/>
             </a:pPr>
             <a:r>
-              <a:t>Потребительская ценность.</a:t>
+              <a:t>Тяга и удар.</a:t>
             </a:r>
           </a:p>
           <a:p>
@@ -3562,31 +3571,23 @@
               <a:defRPr sz="2000"/>
             </a:pPr>
             <a:r>
-              <a:t>Наше уникальное предложение заключается в широком </a:t>
-            </a:r>
-            <a:br/>
-            <a:r>
-              <a:t>выборе высококачественной продукции для скейтбордов </a:t>
-            </a:r>
-            <a:br/>
-            <a:r>
-              <a:t>и нашей знающей команде, которая может предоставить </a:t>
-            </a:r>
-            <a:br/>
-            <a:r>
-              <a:t>индивидуальные рекомендации. Сквот является </a:t>
-            </a:r>
-            <a:br/>
-            <a:r>
-              <a:t>излюбленным местом для скейтбордистов в Санкт-Петербурге </a:t>
-            </a:r>
-            <a:br/>
-            <a:r>
-              <a:t>благодаря нашей приверженности качеству, обслуживанию </a:t>
-            </a:r>
-            <a:br/>
-            <a:r>
-              <a:t>клиентов и пониманию культуры скейтбординга. </a:t>
+              <a:t>При ежемесячной прибыли в 25 000 рублей и стабильной </a:t>
+            </a:r>
+            <a:br/>
+            <a:r>
+              <a:t>ежемесячной посещаемости в 30 000 посетителей </a:t>
+            </a:r>
+            <a:br/>
+            <a:r>
+              <a:t>наш успех очевиден. Поменяв определение удовольствия </a:t>
+            </a:r>
+            <a:br/>
+            <a:r>
+              <a:t>от кофе, мы изменяем восприятие и оценку кофе </a:t>
+            </a:r>
+            <a:br/>
+            <a:r>
+              <a:t>людьми. </a:t>
             </a:r>
           </a:p>
         </p:txBody>
@@ -3633,10 +3634,10 @@
           <a:p/>
           <a:p>
             <a:pPr algn="l">
-              <a:defRPr b="1" sz="6000"/>
+              <a:defRPr b="1" sz="5000"/>
             </a:pPr>
             <a:r>
-              <a:t>Бизнес-команда.</a:t>
+              <a:t>Потребительская ценность.</a:t>
             </a:r>
           </a:p>
           <a:p>
@@ -3644,21 +3645,28 @@
               <a:defRPr sz="2000"/>
             </a:pPr>
             <a:r>
-              <a:t>Дарья Иванова:</a:t>
-            </a:r>
-            <a:br/>
-            <a:r>
-              <a:t>Кассовый аппарат.</a:t>
-            </a:r>
-            <a:br/>
-            <a:r>
-              <a:t>Дмитрий Петров:</a:t>
-            </a:r>
-            <a:br/>
-            <a:r>
-              <a:t>Бухгалтер.</a:t>
-            </a:r>
-            <a:br/>
+              <a:t>Наше уникальное ценностное предложение заключается </a:t>
+            </a:r>
+            <a:br/>
+            <a:r>
+              <a:t>в стремлении к совершенству приготовления кофе, </a:t>
+            </a:r>
+            <a:br/>
+            <a:r>
+              <a:t>обеспечивающему исключительные впечатления </a:t>
+            </a:r>
+            <a:br/>
+            <a:r>
+              <a:t>от кофе. Сочетание исключительного вкуса и </a:t>
+            </a:r>
+            <a:br/>
+            <a:r>
+              <a:t>гостеприимной атмосферы отличает SimpleCoffe </a:t>
+            </a:r>
+            <a:br/>
+            <a:r>
+              <a:t>от конкурентов. </a:t>
+            </a:r>
           </a:p>
         </p:txBody>
       </p:sp>
@@ -3704,10 +3712,10 @@
           <a:p/>
           <a:p>
             <a:pPr algn="l">
-              <a:defRPr b="1" sz="5000"/>
+              <a:defRPr b="1" sz="6000"/>
             </a:pPr>
             <a:r>
-              <a:t>Стратегия расширения рынка.</a:t>
+              <a:t>Бизнес-команда.</a:t>
             </a:r>
           </a:p>
           <a:p>
@@ -3715,28 +3723,21 @@
               <a:defRPr sz="2000"/>
             </a:pPr>
             <a:r>
-              <a:t>В фокусе нашего внимания скейтбордисты и любители </a:t>
-            </a:r>
-            <a:br/>
-            <a:r>
-              <a:t>спорта в возрасте от 18 до 35 лет в Санкт-Петербурге, </a:t>
-            </a:r>
-            <a:br/>
-            <a:r>
-              <a:t>Россия. За пределами Санкт-Петербурга мы планируем </a:t>
-            </a:r>
-            <a:br/>
-            <a:r>
-              <a:t>расширяться и в других городах России, чтобы </a:t>
-            </a:r>
-            <a:br/>
-            <a:r>
-              <a:t>удовлетворить растущий спрос на высококачественную </a:t>
-            </a:r>
-            <a:br/>
-            <a:r>
-              <a:t>продукцию и услуги для скейтбордов. </a:t>
-            </a:r>
+              <a:t>Дарья Иванова:</a:t>
+            </a:r>
+            <a:br/>
+            <a:r>
+              <a:t>Бариста.</a:t>
+            </a:r>
+            <a:br/>
+            <a:r>
+              <a:t>Дмитрий Петров:</a:t>
+            </a:r>
+            <a:br/>
+            <a:r>
+              <a:t>Бухгалтер.</a:t>
+            </a:r>
+            <a:br/>
           </a:p>
         </p:txBody>
       </p:sp>
@@ -3785,7 +3786,7 @@
               <a:defRPr b="1" sz="5000"/>
             </a:pPr>
             <a:r>
-              <a:t>Инвестиционная возможность.</a:t>
+              <a:t>Стратегия расширения рынка.</a:t>
             </a:r>
           </a:p>
           <a:p>
@@ -3793,31 +3794,23 @@
               <a:defRPr sz="2000"/>
             </a:pPr>
             <a:r>
-              <a:t>Наша инвестиционная цель – 10 миллионов рублей. Эти </a:t>
-            </a:r>
-            <a:br/>
-            <a:r>
-              <a:t>средства будут направлены на приобретение нового </a:t>
-            </a:r>
-            <a:br/>
-            <a:r>
-              <a:t>оборудования, расширение ассортимента нашей </a:t>
-            </a:r>
-            <a:br/>
-            <a:r>
-              <a:t>продукции и реализацию маркетинговых стратегий, </a:t>
-            </a:r>
-            <a:br/>
-            <a:r>
-              <a:t>позволяющих удвоить наш доход в течение года. Мы </a:t>
-            </a:r>
-            <a:br/>
-            <a:r>
-              <a:t>стремимся предоставить инвесторам двукратную </a:t>
-            </a:r>
-            <a:br/>
-            <a:r>
-              <a:t>прибыль от своих инвестиций в течение 12 месяцев. </a:t>
+              <a:t>Наше внимание охватывает всех возрастов и полов </a:t>
+            </a:r>
+            <a:br/>
+            <a:r>
+              <a:t>любителей кофе в Санкт-Петербурге. За пределами </a:t>
+            </a:r>
+            <a:br/>
+            <a:r>
+              <a:t>Санкт-Петербурга мы планируем расширяться и </a:t>
+            </a:r>
+            <a:br/>
+            <a:r>
+              <a:t>в других городах, чтобы извлечь выгоду из нашего </a:t>
+            </a:r>
+            <a:br/>
+            <a:r>
+              <a:t>успеха. </a:t>
             </a:r>
           </a:p>
         </p:txBody>
@@ -3867,7 +3860,7 @@
               <a:defRPr b="1" sz="5000"/>
             </a:pPr>
             <a:r>
-              <a:t>Контактная информация.</a:t>
+              <a:t>Инвестиционная возможность.</a:t>
             </a:r>
           </a:p>
           <a:p>
@@ -3875,11 +3868,27 @@
               <a:defRPr sz="2000"/>
             </a:pPr>
             <a:r>
-              <a:t>По вопросам и возможностям партнерства свяжитесь </a:t>
-            </a:r>
-            <a:br/>
-            <a:r>
-              <a:t>с нами напрямую по телефону 123456789. </a:t>
+              <a:t>Наша инвестиционная цель – 10 миллионов рублей. Эти </a:t>
+            </a:r>
+            <a:br/>
+            <a:r>
+              <a:t>средства будут направлены на приобретение современного </a:t>
+            </a:r>
+            <a:br/>
+            <a:r>
+              <a:t>оборудования, повышение качества продукции </a:t>
+            </a:r>
+            <a:br/>
+            <a:r>
+              <a:t>и удвоение выручки в течение года. Мы стремимся </a:t>
+            </a:r>
+            <a:br/>
+            <a:r>
+              <a:t>предоставить инвесторам двукратную прибыль </a:t>
+            </a:r>
+            <a:br/>
+            <a:r>
+              <a:t>от своих инвестиций в течение 12 месяцев. </a:t>
             </a:r>
           </a:p>
         </p:txBody>

</xml_diff>